<commit_message>
Additional technologies added to kickoff slides
</commit_message>
<xml_diff>
--- a/93/technologies/source/hackathon-kickoff.pptx
+++ b/93/technologies/source/hackathon-kickoff.pptx
@@ -3502,7 +3502,7 @@
             </a:r>
             <a:r>
               <a:rPr lang="en-US" sz="1800" dirty="0" smtClean="0"/>
-              <a:t>Daala</a:t>
+              <a:t>Daala, Thor</a:t>
             </a:r>
           </a:p>
           <a:p>
@@ -3519,11 +3519,19 @@
             </a:r>
             <a:r>
               <a:rPr lang="en-US" sz="1800" dirty="0"/>
-              <a:t>/6TiSCH: </a:t>
+              <a:t>/</a:t>
             </a:r>
             <a:r>
               <a:rPr lang="en-US" sz="1800" dirty="0" smtClean="0"/>
-              <a:t>implementing </a:t>
+              <a:t>6TiSCH/</a:t>
+            </a:r>
+            <a:r>
+              <a:rPr lang="en-US" sz="1800" dirty="0" err="1" smtClean="0"/>
+              <a:t>Cryptech</a:t>
+            </a:r>
+            <a:r>
+              <a:rPr lang="en-US" sz="1800" dirty="0" smtClean="0"/>
+              <a:t>: implementing </a:t>
             </a:r>
             <a:r>
               <a:rPr lang="en-US" sz="1800" dirty="0"/>
@@ -3536,8 +3544,12 @@
           </a:p>
           <a:p>
             <a:r>
+              <a:rPr lang="en-US" sz="1800" dirty="0"/>
+              <a:t>RPKI (Resource Public Key </a:t>
+            </a:r>
+            <a:r>
               <a:rPr lang="en-US" sz="1800" dirty="0" smtClean="0"/>
-              <a:t>RPKI</a:t>
+              <a:t>Infrastructure)</a:t>
             </a:r>
           </a:p>
           <a:p>
@@ -3584,6 +3596,8 @@
               <a:rPr lang="en-US" sz="1800" dirty="0" smtClean="0"/>
               <a:t>)</a:t>
             </a:r>
+          </a:p>
+          <a:p>
             <a:endParaRPr lang="en-US" sz="1800" dirty="0"/>
           </a:p>
         </p:txBody>
@@ -4278,7 +4292,7 @@
           <a:lstStyle/>
           <a:p>
             <a:r>
-              <a:rPr lang="en-US" smtClean="0"/>
+              <a:rPr lang="en-US" dirty="0" smtClean="0"/>
               <a:t>Agenda - Sunday</a:t>
             </a:r>
             <a:endParaRPr lang="en-US" dirty="0"/>

</xml_diff>